<commit_message>
second power point photo has been changed
</commit_message>
<xml_diff>
--- a/Second_powerpint.pptx
+++ b/Second_powerpint.pptx
@@ -104,6 +104,11 @@
       </a:defRPr>
     </a:lvl9pPr>
   </p:defaultTextStyle>
+  <p:extLst>
+    <p:ext uri="{EFAFB233-063F-42B5-8137-9DF3F51BA10A}">
+      <p15:sldGuideLst xmlns:p15="http://schemas.microsoft.com/office/powerpoint/2012/main"/>
+    </p:ext>
+  </p:extLst>
 </p:presentation>
 </file>
 
@@ -3323,10 +3328,10 @@
       </p:grpSpPr>
       <p:pic>
         <p:nvPicPr>
-          <p:cNvPr id="5" name="Picture 4">
-            <a:extLst>
-              <a:ext uri="{FF2B5EF4-FFF2-40B4-BE49-F238E27FC236}">
-                <a16:creationId xmlns:a16="http://schemas.microsoft.com/office/drawing/2014/main" id="{3A807EFD-D3CC-95E0-8459-ADEB4FCE5A4C}"/>
+          <p:cNvPr id="3" name="Picture 2">
+            <a:extLst>
+              <a:ext uri="{FF2B5EF4-FFF2-40B4-BE49-F238E27FC236}">
+                <a16:creationId xmlns:a16="http://schemas.microsoft.com/office/drawing/2014/main" id="{F405E111-A83D-8BD0-4C6B-3F135783C40D}"/>
               </a:ext>
             </a:extLst>
           </p:cNvPr>
@@ -3335,7 +3340,7 @@
           </p:cNvPicPr>
           <p:nvPr/>
         </p:nvPicPr>
-        <p:blipFill>
+        <p:blipFill rotWithShape="1">
           <a:blip r:embed="rId2">
             <a:extLst>
               <a:ext uri="{28A0092B-C50C-407E-A947-70E740481C1C}">
@@ -3343,14 +3348,13 @@
               </a:ext>
             </a:extLst>
           </a:blip>
-          <a:stretch>
-            <a:fillRect/>
-          </a:stretch>
+          <a:srcRect l="26782" t="-4400" r="18681" b="25315"/>
+          <a:stretch/>
         </p:blipFill>
         <p:spPr>
-          <a:xfrm rot="5400000">
-            <a:off x="2667000" y="857250"/>
-            <a:ext cx="6858000" cy="5143500"/>
+          <a:xfrm>
+            <a:off x="3200401" y="-295834"/>
+            <a:ext cx="6517340" cy="5316069"/>
           </a:xfrm>
           <a:prstGeom prst="rect">
             <a:avLst/>

</xml_diff>